<commit_message>
SQLSaturday Richmond - Adding sponsor slide
</commit_message>
<xml_diff>
--- a/PSPO-QueryStore.pptx
+++ b/PSPO-QueryStore.pptx
@@ -28,7 +28,7 @@
     <p:sldId id="276" r:id="rId22"/>
     <p:sldId id="277" r:id="rId23"/>
     <p:sldId id="278" r:id="rId24"/>
-    <p:sldId id="279" r:id="rId25"/>
+    <p:sldId id="280" r:id="rId25"/>
   </p:sldIdLst>
   <p:sldSz cx="12192000" cy="6858000"/>
   <p:notesSz cx="6858000" cy="9144000"/>
@@ -127,13 +127,18 @@
       </a:defRPr>
     </a:lvl9pPr>
   </p:defaultTextStyle>
+  <p:extLst>
+    <p:ext uri="{EFAFB233-063F-42B5-8137-9DF3F51BA10A}">
+      <p15:sldGuideLst xmlns:p15="http://schemas.microsoft.com/office/powerpoint/2012/main"/>
+    </p:ext>
+  </p:extLst>
 </p:presentation>
 </file>
 
 <file path=ppt/revisionInfo.xml><?xml version="1.0" encoding="utf-8"?>
 <p1510:revInfo xmlns:a="http://schemas.openxmlformats.org/drawingml/2006/main" xmlns:r="http://schemas.openxmlformats.org/officeDocument/2006/relationships" xmlns:p1510="http://schemas.microsoft.com/office/powerpoint/2015/10/main">
   <p1510:revLst>
-    <p1510:client id="{474B2B08-CB55-46C6-B9FB-E74B121F0FE3}" v="3" dt="2025-03-16T21:02:28.312"/>
+    <p1510:client id="{474B2B08-CB55-46C6-B9FB-E74B121F0FE3}" v="4" dt="2025-03-29T18:22:30.421"/>
   </p1510:revLst>
 </p1510:revInfo>
 </file>
@@ -143,7 +148,7 @@
   <pc:docChgLst>
     <pc:chgData name="Jared Poche" userId="1e6e382f47668c82" providerId="LiveId" clId="{474B2B08-CB55-46C6-B9FB-E74B121F0FE3}"/>
     <pc:docChg chg="undo redo custSel addSld delSld modSld sldOrd">
-      <pc:chgData name="Jared Poche" userId="1e6e382f47668c82" providerId="LiveId" clId="{474B2B08-CB55-46C6-B9FB-E74B121F0FE3}" dt="2025-03-16T21:07:11.454" v="152" actId="20577"/>
+      <pc:chgData name="Jared Poche" userId="1e6e382f47668c82" providerId="LiveId" clId="{474B2B08-CB55-46C6-B9FB-E74B121F0FE3}" dt="2025-03-29T18:23:12.698" v="164" actId="47"/>
       <pc:docMkLst>
         <pc:docMk/>
       </pc:docMkLst>
@@ -205,14 +210,6 @@
             <pc:docMk/>
             <pc:sldMk cId="3081959316" sldId="273"/>
             <ac:spMk id="2" creationId="{59A1393F-B246-6090-F1A8-6D431CE8458F}"/>
-          </ac:spMkLst>
-        </pc:spChg>
-        <pc:spChg chg="add del">
-          <ac:chgData name="Jared Poche" userId="1e6e382f47668c82" providerId="LiveId" clId="{474B2B08-CB55-46C6-B9FB-E74B121F0FE3}" dt="2025-03-16T21:02:26.135" v="26" actId="478"/>
-          <ac:spMkLst>
-            <pc:docMk/>
-            <pc:sldMk cId="3081959316" sldId="273"/>
-            <ac:spMk id="3" creationId="{4F577679-3CFD-6B66-830E-FB51B19C407B}"/>
           </ac:spMkLst>
         </pc:spChg>
         <pc:picChg chg="add mod">
@@ -339,8 +336,8 @@
           </ac:spMkLst>
         </pc:spChg>
       </pc:sldChg>
-      <pc:sldChg chg="addSp delSp modSp new mod modClrScheme chgLayout">
-        <pc:chgData name="Jared Poche" userId="1e6e382f47668c82" providerId="LiveId" clId="{474B2B08-CB55-46C6-B9FB-E74B121F0FE3}" dt="2025-03-16T21:07:11.454" v="152" actId="20577"/>
+      <pc:sldChg chg="addSp delSp modSp new del mod modClrScheme chgLayout">
+        <pc:chgData name="Jared Poche" userId="1e6e382f47668c82" providerId="LiveId" clId="{474B2B08-CB55-46C6-B9FB-E74B121F0FE3}" dt="2025-03-29T18:23:12.698" v="164" actId="47"/>
         <pc:sldMkLst>
           <pc:docMk/>
           <pc:sldMk cId="3383162746" sldId="279"/>
@@ -353,14 +350,6 @@
             <ac:spMk id="2" creationId="{7987B4A2-DA3A-8CB4-CF24-FBBFB1CBADDC}"/>
           </ac:spMkLst>
         </pc:spChg>
-        <pc:spChg chg="del mod ord">
-          <ac:chgData name="Jared Poche" userId="1e6e382f47668c82" providerId="LiveId" clId="{474B2B08-CB55-46C6-B9FB-E74B121F0FE3}" dt="2025-03-16T21:06:53.316" v="109" actId="700"/>
-          <ac:spMkLst>
-            <pc:docMk/>
-            <pc:sldMk cId="3383162746" sldId="279"/>
-            <ac:spMk id="3" creationId="{32AC4F37-683F-F2D3-91FE-82BFA868F753}"/>
-          </ac:spMkLst>
-        </pc:spChg>
         <pc:spChg chg="add mod ord">
           <ac:chgData name="Jared Poche" userId="1e6e382f47668c82" providerId="LiveId" clId="{474B2B08-CB55-46C6-B9FB-E74B121F0FE3}" dt="2025-03-16T21:07:11.454" v="152" actId="20577"/>
           <ac:spMkLst>
@@ -370,20 +359,43 @@
           </ac:spMkLst>
         </pc:spChg>
       </pc:sldChg>
+      <pc:sldChg chg="addSp delSp modSp new mod">
+        <pc:chgData name="Jared Poche" userId="1e6e382f47668c82" providerId="LiveId" clId="{474B2B08-CB55-46C6-B9FB-E74B121F0FE3}" dt="2025-03-29T18:23:03.527" v="163" actId="1076"/>
+        <pc:sldMkLst>
+          <pc:docMk/>
+          <pc:sldMk cId="2847562345" sldId="280"/>
+        </pc:sldMkLst>
+        <pc:spChg chg="del">
+          <ac:chgData name="Jared Poche" userId="1e6e382f47668c82" providerId="LiveId" clId="{474B2B08-CB55-46C6-B9FB-E74B121F0FE3}" dt="2025-03-29T18:22:35.001" v="157" actId="478"/>
+          <ac:spMkLst>
+            <pc:docMk/>
+            <pc:sldMk cId="2847562345" sldId="280"/>
+            <ac:spMk id="2" creationId="{EF7C8FA1-FF29-54FC-4A28-D3E0A845F612}"/>
+          </ac:spMkLst>
+        </pc:spChg>
+        <pc:spChg chg="del">
+          <ac:chgData name="Jared Poche" userId="1e6e382f47668c82" providerId="LiveId" clId="{474B2B08-CB55-46C6-B9FB-E74B121F0FE3}" dt="2025-03-29T18:22:30.421" v="154" actId="931"/>
+          <ac:spMkLst>
+            <pc:docMk/>
+            <pc:sldMk cId="2847562345" sldId="280"/>
+            <ac:spMk id="3" creationId="{C3F523B4-B82A-3FB6-7C32-6B4B857CD29D}"/>
+          </ac:spMkLst>
+        </pc:spChg>
+        <pc:picChg chg="add mod">
+          <ac:chgData name="Jared Poche" userId="1e6e382f47668c82" providerId="LiveId" clId="{474B2B08-CB55-46C6-B9FB-E74B121F0FE3}" dt="2025-03-29T18:23:03.527" v="163" actId="1076"/>
+          <ac:picMkLst>
+            <pc:docMk/>
+            <pc:sldMk cId="2847562345" sldId="280"/>
+            <ac:picMk id="5" creationId="{EC012A2A-C183-BC5F-60E0-6E488A1D5423}"/>
+          </ac:picMkLst>
+        </pc:picChg>
+      </pc:sldChg>
       <pc:sldChg chg="modSp add del mod">
         <pc:chgData name="Jared Poche" userId="1e6e382f47668c82" providerId="LiveId" clId="{474B2B08-CB55-46C6-B9FB-E74B121F0FE3}" dt="2025-03-16T21:02:14.981" v="24"/>
         <pc:sldMkLst>
           <pc:docMk/>
           <pc:sldMk cId="1093186382" sldId="329"/>
         </pc:sldMkLst>
-        <pc:picChg chg="mod">
-          <ac:chgData name="Jared Poche" userId="1e6e382f47668c82" providerId="LiveId" clId="{474B2B08-CB55-46C6-B9FB-E74B121F0FE3}" dt="2025-03-16T21:02:14.312" v="23" actId="1076"/>
-          <ac:picMkLst>
-            <pc:docMk/>
-            <pc:sldMk cId="1093186382" sldId="329"/>
-            <ac:picMk id="8" creationId="{72817B93-2DA5-CD2C-5687-C7CDB057CC3D}"/>
-          </ac:picMkLst>
-        </pc:picChg>
       </pc:sldChg>
     </pc:docChg>
   </pc:docChgLst>
@@ -3892,7 +3904,7 @@
           <a:p>
             <a:fld id="{19F70C2C-E73F-48BF-BC2E-C4687BE9F105}" type="datetimeFigureOut">
               <a:rPr lang="en-US" smtClean="0"/>
-              <a:t>3/16/2025</a:t>
+              <a:t>3/29/2025</a:t>
             </a:fld>
             <a:endParaRPr lang="en-US"/>
           </a:p>
@@ -4103,7 +4115,7 @@
           <a:p>
             <a:fld id="{19F70C2C-E73F-48BF-BC2E-C4687BE9F105}" type="datetimeFigureOut">
               <a:rPr lang="en-US" smtClean="0"/>
-              <a:t>3/16/2025</a:t>
+              <a:t>3/29/2025</a:t>
             </a:fld>
             <a:endParaRPr lang="en-US"/>
           </a:p>
@@ -4318,7 +4330,7 @@
           <a:p>
             <a:fld id="{19F70C2C-E73F-48BF-BC2E-C4687BE9F105}" type="datetimeFigureOut">
               <a:rPr lang="en-US" smtClean="0"/>
-              <a:t>3/16/2025</a:t>
+              <a:t>3/29/2025</a:t>
             </a:fld>
             <a:endParaRPr lang="en-US"/>
           </a:p>
@@ -4519,7 +4531,7 @@
           <a:p>
             <a:fld id="{19F70C2C-E73F-48BF-BC2E-C4687BE9F105}" type="datetimeFigureOut">
               <a:rPr lang="en-US" smtClean="0"/>
-              <a:t>3/16/2025</a:t>
+              <a:t>3/29/2025</a:t>
             </a:fld>
             <a:endParaRPr lang="en-US"/>
           </a:p>
@@ -4798,7 +4810,7 @@
           <a:p>
             <a:fld id="{19F70C2C-E73F-48BF-BC2E-C4687BE9F105}" type="datetimeFigureOut">
               <a:rPr lang="en-US" smtClean="0"/>
-              <a:t>3/16/2025</a:t>
+              <a:t>3/29/2025</a:t>
             </a:fld>
             <a:endParaRPr lang="en-US"/>
           </a:p>
@@ -5066,7 +5078,7 @@
           <a:p>
             <a:fld id="{19F70C2C-E73F-48BF-BC2E-C4687BE9F105}" type="datetimeFigureOut">
               <a:rPr lang="en-US" smtClean="0"/>
-              <a:t>3/16/2025</a:t>
+              <a:t>3/29/2025</a:t>
             </a:fld>
             <a:endParaRPr lang="en-US"/>
           </a:p>
@@ -5482,7 +5494,7 @@
           <a:p>
             <a:fld id="{19F70C2C-E73F-48BF-BC2E-C4687BE9F105}" type="datetimeFigureOut">
               <a:rPr lang="en-US" smtClean="0"/>
-              <a:t>3/16/2025</a:t>
+              <a:t>3/29/2025</a:t>
             </a:fld>
             <a:endParaRPr lang="en-US"/>
           </a:p>
@@ -5631,7 +5643,7 @@
           <a:p>
             <a:fld id="{19F70C2C-E73F-48BF-BC2E-C4687BE9F105}" type="datetimeFigureOut">
               <a:rPr lang="en-US" smtClean="0"/>
-              <a:t>3/16/2025</a:t>
+              <a:t>3/29/2025</a:t>
             </a:fld>
             <a:endParaRPr lang="en-US"/>
           </a:p>
@@ -5757,7 +5769,7 @@
           <a:p>
             <a:fld id="{19F70C2C-E73F-48BF-BC2E-C4687BE9F105}" type="datetimeFigureOut">
               <a:rPr lang="en-US" smtClean="0"/>
-              <a:t>3/16/2025</a:t>
+              <a:t>3/29/2025</a:t>
             </a:fld>
             <a:endParaRPr lang="en-US"/>
           </a:p>
@@ -6008,7 +6020,7 @@
           <a:p>
             <a:fld id="{19F70C2C-E73F-48BF-BC2E-C4687BE9F105}" type="datetimeFigureOut">
               <a:rPr lang="en-US" smtClean="0"/>
-              <a:t>3/16/2025</a:t>
+              <a:t>3/29/2025</a:t>
             </a:fld>
             <a:endParaRPr lang="en-US"/>
           </a:p>
@@ -6453,7 +6465,7 @@
           <a:p>
             <a:fld id="{19F70C2C-E73F-48BF-BC2E-C4687BE9F105}" type="datetimeFigureOut">
               <a:rPr lang="en-US" smtClean="0"/>
-              <a:t>3/16/2025</a:t>
+              <a:t>3/29/2025</a:t>
             </a:fld>
             <a:endParaRPr lang="en-US"/>
           </a:p>
@@ -6780,7 +6792,7 @@
           <a:p>
             <a:fld id="{19F70C2C-E73F-48BF-BC2E-C4687BE9F105}" type="datetimeFigureOut">
               <a:rPr lang="en-US" smtClean="0"/>
-              <a:t>3/16/2025</a:t>
+              <a:t>3/29/2025</a:t>
             </a:fld>
             <a:endParaRPr lang="en-US"/>
           </a:p>
@@ -13291,70 +13303,45 @@
           <a:chExt cx="0" cy="0"/>
         </a:xfrm>
       </p:grpSpPr>
-      <p:sp>
-        <p:nvSpPr>
-          <p:cNvPr id="2" name="Title 1">
+      <p:pic>
+        <p:nvPicPr>
+          <p:cNvPr id="5" name="Content Placeholder 4" descr="Several logos of different brands&#10;&#10;AI-generated content may be incorrect.">
             <a:extLst>
               <a:ext uri="{FF2B5EF4-FFF2-40B4-BE49-F238E27FC236}">
-                <a16:creationId xmlns:a16="http://schemas.microsoft.com/office/drawing/2014/main" id="{7987B4A2-DA3A-8CB4-CF24-FBBFB1CBADDC}"/>
+                <a16:creationId xmlns:a16="http://schemas.microsoft.com/office/drawing/2014/main" id="{EC012A2A-C183-BC5F-60E0-6E488A1D5423}"/>
               </a:ext>
             </a:extLst>
           </p:cNvPr>
-          <p:cNvSpPr>
-            <a:spLocks noGrp="1"/>
-          </p:cNvSpPr>
+          <p:cNvPicPr>
+            <a:picLocks noGrp="1" noChangeAspect="1"/>
+          </p:cNvPicPr>
           <p:nvPr>
-            <p:ph type="ctrTitle"/>
+            <p:ph idx="1"/>
           </p:nvPr>
-        </p:nvSpPr>
-        <p:spPr/>
-        <p:txBody>
-          <a:bodyPr/>
-          <a:lstStyle/>
-          <a:p>
-            <a:r>
-              <a:rPr lang="en-US" dirty="0"/>
-              <a:t>Thank you</a:t>
-            </a:r>
-          </a:p>
-        </p:txBody>
-      </p:sp>
-      <p:sp>
-        <p:nvSpPr>
-          <p:cNvPr id="4" name="Subtitle 3">
+        </p:nvPicPr>
+        <p:blipFill>
+          <a:blip r:embed="rId2">
             <a:extLst>
-              <a:ext uri="{FF2B5EF4-FFF2-40B4-BE49-F238E27FC236}">
-                <a16:creationId xmlns:a16="http://schemas.microsoft.com/office/drawing/2014/main" id="{C8CF5FB2-3BDD-8EDD-0FB2-E96C760FA9E9}"/>
+              <a:ext uri="{28A0092B-C50C-407E-A947-70E740481C1C}">
+                <a14:useLocalDpi xmlns:a14="http://schemas.microsoft.com/office/drawing/2010/main" val="0"/>
               </a:ext>
             </a:extLst>
-          </p:cNvPr>
-          <p:cNvSpPr>
-            <a:spLocks noGrp="1"/>
-          </p:cNvSpPr>
-          <p:nvPr>
-            <p:ph type="subTitle" idx="1"/>
-          </p:nvPr>
-        </p:nvSpPr>
-        <p:spPr/>
-        <p:txBody>
-          <a:bodyPr/>
-          <a:lstStyle/>
-          <a:p>
-            <a:r>
-              <a:rPr lang="en-US" dirty="0"/>
-              <a:t>Hope you enjoyed </a:t>
-            </a:r>
-            <a:r>
-              <a:rPr lang="en-US"/>
-              <a:t>the session!</a:t>
-            </a:r>
-          </a:p>
-        </p:txBody>
-      </p:sp>
+          </a:blip>
+          <a:stretch>
+            <a:fillRect/>
+          </a:stretch>
+        </p:blipFill>
+        <p:spPr>
+          <a:xfrm>
+            <a:off x="0" y="0"/>
+            <a:ext cx="12191997" cy="6857999"/>
+          </a:xfrm>
+        </p:spPr>
+      </p:pic>
     </p:spTree>
     <p:extLst>
       <p:ext uri="{BB962C8B-B14F-4D97-AF65-F5344CB8AC3E}">
-        <p14:creationId xmlns:p14="http://schemas.microsoft.com/office/powerpoint/2010/main" val="3383162746"/>
+        <p14:creationId xmlns:p14="http://schemas.microsoft.com/office/powerpoint/2010/main" val="2847562345"/>
       </p:ext>
     </p:extLst>
   </p:cSld>

</xml_diff>